<commit_message>
try to use gitignore
</commit_message>
<xml_diff>
--- a/2019date - topic.pptx
+++ b/2019date - topic.pptx
@@ -285,7 +285,38 @@
         <p:spPr/>
         <p:txBody>
           <a:bodyPr/>
-          <a:lstStyle/>
+          <a:lstStyle>
+            <a:lvl1pPr>
+              <a:defRPr>
+                <a:latin typeface="Times New Roman" panose="02020603050405020304" pitchFamily="18" charset="0"/>
+                <a:cs typeface="Times New Roman" panose="02020603050405020304" pitchFamily="18" charset="0"/>
+              </a:defRPr>
+            </a:lvl1pPr>
+            <a:lvl2pPr>
+              <a:defRPr>
+                <a:latin typeface="Times New Roman" panose="02020603050405020304" pitchFamily="18" charset="0"/>
+                <a:cs typeface="Times New Roman" panose="02020603050405020304" pitchFamily="18" charset="0"/>
+              </a:defRPr>
+            </a:lvl2pPr>
+            <a:lvl3pPr>
+              <a:defRPr>
+                <a:latin typeface="Times New Roman" panose="02020603050405020304" pitchFamily="18" charset="0"/>
+                <a:cs typeface="Times New Roman" panose="02020603050405020304" pitchFamily="18" charset="0"/>
+              </a:defRPr>
+            </a:lvl3pPr>
+            <a:lvl4pPr>
+              <a:defRPr>
+                <a:latin typeface="Times New Roman" panose="02020603050405020304" pitchFamily="18" charset="0"/>
+                <a:cs typeface="Times New Roman" panose="02020603050405020304" pitchFamily="18" charset="0"/>
+              </a:defRPr>
+            </a:lvl4pPr>
+            <a:lvl5pPr>
+              <a:defRPr>
+                <a:latin typeface="Times New Roman" panose="02020603050405020304" pitchFamily="18" charset="0"/>
+                <a:cs typeface="Times New Roman" panose="02020603050405020304" pitchFamily="18" charset="0"/>
+              </a:defRPr>
+            </a:lvl5pPr>
+          </a:lstStyle>
           <a:p>
             <a:pPr lvl="0"/>
             <a:r>
@@ -405,7 +436,38 @@
         </p:spPr>
         <p:txBody>
           <a:bodyPr/>
-          <a:lstStyle/>
+          <a:lstStyle>
+            <a:lvl1pPr>
+              <a:defRPr>
+                <a:latin typeface="Times New Roman" panose="02020603050405020304" pitchFamily="18" charset="0"/>
+                <a:cs typeface="Times New Roman" panose="02020603050405020304" pitchFamily="18" charset="0"/>
+              </a:defRPr>
+            </a:lvl1pPr>
+            <a:lvl2pPr>
+              <a:defRPr>
+                <a:latin typeface="Times New Roman" panose="02020603050405020304" pitchFamily="18" charset="0"/>
+                <a:cs typeface="Times New Roman" panose="02020603050405020304" pitchFamily="18" charset="0"/>
+              </a:defRPr>
+            </a:lvl2pPr>
+            <a:lvl3pPr>
+              <a:defRPr>
+                <a:latin typeface="Times New Roman" panose="02020603050405020304" pitchFamily="18" charset="0"/>
+                <a:cs typeface="Times New Roman" panose="02020603050405020304" pitchFamily="18" charset="0"/>
+              </a:defRPr>
+            </a:lvl3pPr>
+            <a:lvl4pPr>
+              <a:defRPr>
+                <a:latin typeface="Times New Roman" panose="02020603050405020304" pitchFamily="18" charset="0"/>
+                <a:cs typeface="Times New Roman" panose="02020603050405020304" pitchFamily="18" charset="0"/>
+              </a:defRPr>
+            </a:lvl4pPr>
+            <a:lvl5pPr>
+              <a:defRPr>
+                <a:latin typeface="Times New Roman" panose="02020603050405020304" pitchFamily="18" charset="0"/>
+                <a:cs typeface="Times New Roman" panose="02020603050405020304" pitchFamily="18" charset="0"/>
+              </a:defRPr>
+            </a:lvl5pPr>
+          </a:lstStyle>
           <a:p>
             <a:pPr lvl="0"/>
             <a:r>
@@ -525,7 +587,38 @@
         </p:spPr>
         <p:txBody>
           <a:bodyPr/>
-          <a:lstStyle/>
+          <a:lstStyle>
+            <a:lvl1pPr>
+              <a:defRPr>
+                <a:latin typeface="Times New Roman" panose="02020603050405020304" pitchFamily="18" charset="0"/>
+                <a:cs typeface="Times New Roman" panose="02020603050405020304" pitchFamily="18" charset="0"/>
+              </a:defRPr>
+            </a:lvl1pPr>
+            <a:lvl2pPr>
+              <a:defRPr>
+                <a:latin typeface="Times New Roman" panose="02020603050405020304" pitchFamily="18" charset="0"/>
+                <a:cs typeface="Times New Roman" panose="02020603050405020304" pitchFamily="18" charset="0"/>
+              </a:defRPr>
+            </a:lvl2pPr>
+            <a:lvl3pPr>
+              <a:defRPr>
+                <a:latin typeface="Times New Roman" panose="02020603050405020304" pitchFamily="18" charset="0"/>
+                <a:cs typeface="Times New Roman" panose="02020603050405020304" pitchFamily="18" charset="0"/>
+              </a:defRPr>
+            </a:lvl3pPr>
+            <a:lvl4pPr>
+              <a:defRPr>
+                <a:latin typeface="Times New Roman" panose="02020603050405020304" pitchFamily="18" charset="0"/>
+                <a:cs typeface="Times New Roman" panose="02020603050405020304" pitchFamily="18" charset="0"/>
+              </a:defRPr>
+            </a:lvl4pPr>
+            <a:lvl5pPr>
+              <a:defRPr>
+                <a:latin typeface="Times New Roman" panose="02020603050405020304" pitchFamily="18" charset="0"/>
+                <a:cs typeface="Times New Roman" panose="02020603050405020304" pitchFamily="18" charset="0"/>
+              </a:defRPr>
+            </a:lvl5pPr>
+          </a:lstStyle>
           <a:p>
             <a:pPr lvl="0"/>
             <a:r>

</xml_diff>